<commit_message>
add document comparing against google services.
</commit_message>
<xml_diff>
--- a/doc/SensorTalk_Google 서비스 비교.pptx
+++ b/doc/SensorTalk_Google 서비스 비교.pptx
@@ -6,11 +6,12 @@
   </p:sldMasterIdLst>
   <p:sldIdLst>
     <p:sldId id="256" r:id="rId2"/>
-    <p:sldId id="257" r:id="rId3"/>
-    <p:sldId id="262" r:id="rId4"/>
-    <p:sldId id="261" r:id="rId5"/>
-    <p:sldId id="263" r:id="rId6"/>
-    <p:sldId id="264" r:id="rId7"/>
+    <p:sldId id="265" r:id="rId3"/>
+    <p:sldId id="257" r:id="rId4"/>
+    <p:sldId id="262" r:id="rId5"/>
+    <p:sldId id="261" r:id="rId6"/>
+    <p:sldId id="263" r:id="rId7"/>
+    <p:sldId id="264" r:id="rId8"/>
   </p:sldIdLst>
   <p:sldSz cx="9144000" cy="6858000" type="screen4x3"/>
   <p:notesSz cx="6858000" cy="9144000"/>
@@ -3204,6 +3205,180 @@
           <a:lstStyle/>
           <a:p>
             <a:r>
+              <a:rPr lang="en-US" dirty="0" err="1" smtClean="0"/>
+              <a:t>SensorTalk</a:t>
+            </a:r>
+            <a:r>
+              <a:rPr lang="ko-KR" altLang="en-US" dirty="0" smtClean="0"/>
+              <a:t> 개요</a:t>
+            </a:r>
+            <a:endParaRPr lang="en-US" dirty="0"/>
+          </a:p>
+        </p:txBody>
+      </p:sp>
+      <p:sp>
+        <p:nvSpPr>
+          <p:cNvPr id="3" name="Content Placeholder 2"/>
+          <p:cNvSpPr>
+            <a:spLocks noGrp="1"/>
+          </p:cNvSpPr>
+          <p:nvPr>
+            <p:ph idx="1"/>
+          </p:nvPr>
+        </p:nvSpPr>
+        <p:spPr/>
+        <p:txBody>
+          <a:bodyPr/>
+          <a:lstStyle/>
+          <a:p>
+            <a:r>
+              <a:rPr lang="en-US" dirty="0" err="1" smtClean="0"/>
+              <a:t>PubSub</a:t>
+            </a:r>
+            <a:r>
+              <a:rPr lang="en-US" dirty="0" smtClean="0"/>
+              <a:t> </a:t>
+            </a:r>
+            <a:r>
+              <a:rPr lang="ko-KR" altLang="en-US" dirty="0" smtClean="0"/>
+              <a:t>개념을 응용하여</a:t>
+            </a:r>
+            <a:r>
+              <a:rPr lang="en-US" altLang="ko-KR" dirty="0" smtClean="0"/>
+              <a:t>,</a:t>
+            </a:r>
+            <a:r>
+              <a:rPr lang="ko-KR" altLang="en-US" dirty="0" smtClean="0"/>
+              <a:t> 공인 </a:t>
+            </a:r>
+            <a:r>
+              <a:rPr lang="en-US" altLang="ko-KR" dirty="0" smtClean="0"/>
+              <a:t>IP  </a:t>
+            </a:r>
+            <a:r>
+              <a:rPr lang="ko-KR" altLang="en-US" dirty="0" smtClean="0"/>
+              <a:t>주소가 부여되어 있지 않은 </a:t>
+            </a:r>
+            <a:r>
+              <a:rPr lang="en-US" altLang="ko-KR" dirty="0" smtClean="0"/>
+              <a:t>connected device </a:t>
+            </a:r>
+            <a:r>
+              <a:rPr lang="ko-KR" altLang="en-US" dirty="0" smtClean="0"/>
+              <a:t>에 </a:t>
+            </a:r>
+            <a:r>
+              <a:rPr lang="en-US" altLang="ko-KR" dirty="0" smtClean="0"/>
+              <a:t>TCP request </a:t>
+            </a:r>
+            <a:r>
+              <a:rPr lang="ko-KR" altLang="en-US" dirty="0" smtClean="0"/>
+              <a:t>를 전송하는 기술</a:t>
+            </a:r>
+            <a:endParaRPr lang="en-US" altLang="ko-KR" dirty="0" smtClean="0"/>
+          </a:p>
+          <a:p>
+            <a:r>
+              <a:rPr lang="en-US" dirty="0" err="1" smtClean="0"/>
+              <a:t>SensorTalk</a:t>
+            </a:r>
+            <a:r>
+              <a:rPr lang="en-US" dirty="0" smtClean="0"/>
+              <a:t> </a:t>
+            </a:r>
+            <a:r>
+              <a:rPr lang="ko-KR" altLang="en-US" dirty="0" smtClean="0"/>
+              <a:t>에 등록된 </a:t>
+            </a:r>
+            <a:r>
+              <a:rPr lang="en-US" altLang="ko-KR" dirty="0" smtClean="0"/>
+              <a:t>device </a:t>
+            </a:r>
+            <a:r>
+              <a:rPr lang="ko-KR" altLang="en-US" dirty="0" smtClean="0"/>
+              <a:t>의 </a:t>
+            </a:r>
+            <a:r>
+              <a:rPr lang="en-US" altLang="ko-KR" dirty="0" smtClean="0"/>
+              <a:t>nickname</a:t>
+            </a:r>
+            <a:r>
+              <a:rPr lang="ko-KR" altLang="en-US" dirty="0" smtClean="0"/>
+              <a:t> 을 이용하여 </a:t>
+            </a:r>
+            <a:r>
+              <a:rPr lang="en-US" altLang="ko-KR" dirty="0" smtClean="0"/>
+              <a:t>TCP request </a:t>
+            </a:r>
+            <a:r>
+              <a:rPr lang="ko-KR" altLang="en-US" dirty="0" smtClean="0"/>
+              <a:t>를 전송함</a:t>
+            </a:r>
+            <a:endParaRPr lang="en-US" altLang="ko-KR" dirty="0" smtClean="0"/>
+          </a:p>
+          <a:p>
+            <a:r>
+              <a:rPr lang="ko-KR" altLang="en-US" dirty="0" smtClean="0"/>
+              <a:t>가정 내 </a:t>
+            </a:r>
+            <a:r>
+              <a:rPr lang="en-US" altLang="ko-KR" dirty="0" smtClean="0"/>
+              <a:t>Smart Home Device </a:t>
+            </a:r>
+            <a:r>
+              <a:rPr lang="ko-KR" altLang="en-US" dirty="0" smtClean="0"/>
+              <a:t>에 브라우저로 직접 접속하는 것을 가능하게 함</a:t>
+            </a:r>
+            <a:endParaRPr lang="en-US" dirty="0"/>
+          </a:p>
+        </p:txBody>
+      </p:sp>
+    </p:spTree>
+    <p:extLst>
+      <p:ext uri="{BB962C8B-B14F-4D97-AF65-F5344CB8AC3E}">
+        <p14:creationId xmlns:p14="http://schemas.microsoft.com/office/powerpoint/2010/main" val="1675856919"/>
+      </p:ext>
+    </p:extLst>
+  </p:cSld>
+  <p:clrMapOvr>
+    <a:masterClrMapping/>
+  </p:clrMapOvr>
+</p:sld>
+</file>
+
+<file path=ppt/slides/slide3.xml><?xml version="1.0" encoding="utf-8"?>
+<p:sld xmlns:a="http://schemas.openxmlformats.org/drawingml/2006/main" xmlns:r="http://schemas.openxmlformats.org/officeDocument/2006/relationships" xmlns:p="http://schemas.openxmlformats.org/presentationml/2006/main">
+  <p:cSld>
+    <p:spTree>
+      <p:nvGrpSpPr>
+        <p:cNvPr id="1" name=""/>
+        <p:cNvGrpSpPr/>
+        <p:nvPr/>
+      </p:nvGrpSpPr>
+      <p:grpSpPr>
+        <a:xfrm>
+          <a:off x="0" y="0"/>
+          <a:ext cx="0" cy="0"/>
+          <a:chOff x="0" y="0"/>
+          <a:chExt cx="0" cy="0"/>
+        </a:xfrm>
+      </p:grpSpPr>
+      <p:sp>
+        <p:nvSpPr>
+          <p:cNvPr id="2" name="Title 1"/>
+          <p:cNvSpPr>
+            <a:spLocks noGrp="1"/>
+          </p:cNvSpPr>
+          <p:nvPr>
+            <p:ph type="title"/>
+          </p:nvPr>
+        </p:nvSpPr>
+        <p:spPr/>
+        <p:txBody>
+          <a:bodyPr/>
+          <a:lstStyle/>
+          <a:p>
+            <a:r>
               <a:rPr lang="en-US" dirty="0" smtClean="0"/>
               <a:t>Google Pub/Sub </a:t>
             </a:r>
@@ -3802,7 +3977,7 @@
 </p:sld>
 </file>
 
-<file path=ppt/slides/slide3.xml><?xml version="1.0" encoding="utf-8"?>
+<file path=ppt/slides/slide4.xml><?xml version="1.0" encoding="utf-8"?>
 <p:sld xmlns:a="http://schemas.openxmlformats.org/drawingml/2006/main" xmlns:r="http://schemas.openxmlformats.org/officeDocument/2006/relationships" xmlns:p="http://schemas.openxmlformats.org/presentationml/2006/main">
   <p:cSld>
     <p:spTree>
@@ -4332,7 +4507,7 @@
 </p:sld>
 </file>
 
-<file path=ppt/slides/slide4.xml><?xml version="1.0" encoding="utf-8"?>
+<file path=ppt/slides/slide5.xml><?xml version="1.0" encoding="utf-8"?>
 <p:sld xmlns:a="http://schemas.openxmlformats.org/drawingml/2006/main" xmlns:r="http://schemas.openxmlformats.org/officeDocument/2006/relationships" xmlns:p="http://schemas.openxmlformats.org/presentationml/2006/main">
   <p:cSld>
     <p:spTree>
@@ -4662,7 +4837,7 @@
 </p:sld>
 </file>
 
-<file path=ppt/slides/slide5.xml><?xml version="1.0" encoding="utf-8"?>
+<file path=ppt/slides/slide6.xml><?xml version="1.0" encoding="utf-8"?>
 <p:sld xmlns:a="http://schemas.openxmlformats.org/drawingml/2006/main" xmlns:r="http://schemas.openxmlformats.org/officeDocument/2006/relationships" xmlns:p="http://schemas.openxmlformats.org/presentationml/2006/main">
   <p:cSld>
     <p:spTree>
@@ -4770,11 +4945,7 @@
                     <a:p>
                       <a:r>
                         <a:rPr lang="en-US" sz="1600" dirty="0" smtClean="0"/>
-                        <a:t>Google P</a:t>
-                      </a:r>
-                      <a:r>
-                        <a:rPr lang="en-US" sz="1600" dirty="0" smtClean="0"/>
-                        <a:t>hysical</a:t>
+                        <a:t>Google Physical</a:t>
                       </a:r>
                       <a:r>
                         <a:rPr lang="en-US" sz="1600" baseline="0" dirty="0" smtClean="0"/>
@@ -5377,7 +5548,7 @@
 </p:sld>
 </file>
 
-<file path=ppt/slides/slide6.xml><?xml version="1.0" encoding="utf-8"?>
+<file path=ppt/slides/slide7.xml><?xml version="1.0" encoding="utf-8"?>
 <p:sld xmlns:a="http://schemas.openxmlformats.org/drawingml/2006/main" xmlns:r="http://schemas.openxmlformats.org/officeDocument/2006/relationships" xmlns:p="http://schemas.openxmlformats.org/presentationml/2006/main">
   <p:cSld>
     <p:spTree>

</xml_diff>